<commit_message>
technical archtecture joguem the baggwot eoyo
Signed-off-by: GangHyeok Lee <rkdgur5381@gmail.com>
</commit_message>
<xml_diff>
--- a/document/technical_architecture.pptx
+++ b/document/technical_architecture.pptx
@@ -6153,7 +6153,7 @@
           </p:nvSpPr>
           <p:spPr>
             <a:xfrm>
-              <a:off x="3954663" y="5664696"/>
+              <a:off x="4225051" y="5664696"/>
               <a:ext cx="1077090" cy="323165"/>
             </a:xfrm>
             <a:prstGeom prst="rect">
@@ -6185,7 +6185,7 @@
           </p:nvSpPr>
           <p:spPr>
             <a:xfrm>
-              <a:off x="7851259" y="4646547"/>
+              <a:off x="7922465" y="4646547"/>
               <a:ext cx="1077090" cy="323165"/>
             </a:xfrm>
             <a:prstGeom prst="rect">
@@ -6217,7 +6217,7 @@
           </p:nvSpPr>
           <p:spPr>
             <a:xfrm>
-              <a:off x="9742499" y="4666747"/>
+              <a:off x="9736560" y="4666747"/>
               <a:ext cx="1069200" cy="323165"/>
             </a:xfrm>
             <a:prstGeom prst="rect">
@@ -6281,8 +6281,8 @@
           </p:nvSpPr>
           <p:spPr>
             <a:xfrm>
-              <a:off x="4113747" y="3886562"/>
-              <a:ext cx="1214435" cy="553998"/>
+              <a:off x="4026680" y="3886562"/>
+              <a:ext cx="1206000" cy="553998"/>
             </a:xfrm>
             <a:prstGeom prst="rect">
               <a:avLst/>
@@ -6292,7 +6292,7 @@
             </a:solidFill>
           </p:spPr>
           <p:txBody>
-            <a:bodyPr wrap="none" rtlCol="0">
+            <a:bodyPr wrap="square" rtlCol="0">
               <a:spAutoFit/>
             </a:bodyPr>
             <a:lstStyle/>
@@ -6319,7 +6319,7 @@
           </p:nvSpPr>
           <p:spPr>
             <a:xfrm>
-              <a:off x="4113747" y="4423883"/>
+              <a:off x="4115373" y="4423883"/>
               <a:ext cx="1028615" cy="553998"/>
             </a:xfrm>
             <a:prstGeom prst="rect">
@@ -6393,7 +6393,7 @@
           </p:nvSpPr>
           <p:spPr>
             <a:xfrm>
-              <a:off x="9834821" y="7130855"/>
+              <a:off x="9935972" y="7130855"/>
               <a:ext cx="670376" cy="323165"/>
             </a:xfrm>
             <a:prstGeom prst="rect">
@@ -6425,7 +6425,7 @@
           </p:nvSpPr>
           <p:spPr>
             <a:xfrm>
-              <a:off x="7866929" y="6240760"/>
+              <a:off x="7862257" y="6240760"/>
               <a:ext cx="1197507" cy="323165"/>
             </a:xfrm>
             <a:prstGeom prst="rect">
@@ -6461,7 +6461,7 @@
           </p:nvSpPr>
           <p:spPr>
             <a:xfrm>
-              <a:off x="8132275" y="7069723"/>
+              <a:off x="8136820" y="7069723"/>
               <a:ext cx="670376" cy="323165"/>
             </a:xfrm>
             <a:prstGeom prst="rect">
@@ -6493,7 +6493,7 @@
           </p:nvSpPr>
           <p:spPr>
             <a:xfrm>
-              <a:off x="3199827" y="6732808"/>
+              <a:off x="3247155" y="6732808"/>
               <a:ext cx="3032882" cy="323165"/>
             </a:xfrm>
             <a:prstGeom prst="rect">
@@ -6557,7 +6557,7 @@
           </p:nvSpPr>
           <p:spPr>
             <a:xfrm>
-              <a:off x="4113747" y="2010877"/>
+              <a:off x="4112167" y="2010877"/>
               <a:ext cx="1035027" cy="553998"/>
             </a:xfrm>
             <a:prstGeom prst="rect">
@@ -6633,7 +6633,7 @@
           </p:nvSpPr>
           <p:spPr>
             <a:xfrm>
-              <a:off x="4113747" y="2734434"/>
+              <a:off x="4115373" y="2734434"/>
               <a:ext cx="1028615" cy="553998"/>
             </a:xfrm>
             <a:prstGeom prst="rect">

</xml_diff>